<commit_message>
Added posters for the Spring 2024 schedule
</commit_message>
<xml_diff>
--- a/posters/2024_spring/corissa_marson_240117.pptx
+++ b/posters/2024_spring/corissa_marson_240117.pptx
@@ -254,7 +254,7 @@
       <p15:sldGuideLst xmlns:p15="http://schemas.microsoft.com/office/powerpoint/2012/main"/>
     </p:ext>
     <p:ext uri="http://customooxmlschemas.google.com/">
-      <go:slidesCustomData xmlns:go="http://customooxmlschemas.google.com/" xmlns:ahyp="http://schemas.microsoft.com/office/drawing/2018/hyperlinkcolor" xmlns:p15="http://schemas.microsoft.com/office/powerpoint/2012/main" xmlns:p14="http://schemas.microsoft.com/office/powerpoint/2010/main" xmlns:com="http://schemas.openxmlformats.org/drawingml/2006/compatibility" xmlns:pvml="urn:schemas-microsoft-com:office:powerpoint" xmlns:v="urn:schemas-microsoft-com:vml" xmlns:o="urn:schemas-microsoft-com:office:office" xmlns:dgm="http://schemas.openxmlformats.org/drawingml/2006/diagram" xmlns:c="http://schemas.openxmlformats.org/drawingml/2006/chart" xmlns:mv="urn:schemas-microsoft-com:mac:vml" xmlns:mc="http://schemas.openxmlformats.org/markup-compatibility/2006" xmlns="" r:id="rId12" roundtripDataSignature="AMtx7mj9Ic0Cos0+1WxzYeHFBp4wMVEnvg=="/>
+      <go:slidesCustomData xmlns="" xmlns:mc="http://schemas.openxmlformats.org/markup-compatibility/2006" xmlns:mv="urn:schemas-microsoft-com:mac:vml" xmlns:c="http://schemas.openxmlformats.org/drawingml/2006/chart" xmlns:dgm="http://schemas.openxmlformats.org/drawingml/2006/diagram" xmlns:o="urn:schemas-microsoft-com:office:office" xmlns:v="urn:schemas-microsoft-com:vml" xmlns:pvml="urn:schemas-microsoft-com:office:powerpoint" xmlns:com="http://schemas.openxmlformats.org/drawingml/2006/compatibility" xmlns:p14="http://schemas.microsoft.com/office/powerpoint/2010/main" xmlns:p15="http://schemas.microsoft.com/office/powerpoint/2012/main" xmlns:ahyp="http://schemas.microsoft.com/office/drawing/2018/hyperlinkcolor" xmlns:go="http://customooxmlschemas.google.com/" r:id="rId12" roundtripDataSignature="AMtx7mj9Ic0Cos0+1WxzYeHFBp4wMVEnvg=="/>
     </p:ext>
   </p:extLst>
 </p:presentation>
@@ -11234,8 +11234,8 @@
         </p:nvSpPr>
         <p:spPr>
           <a:xfrm>
-            <a:off x="3384646" y="2364405"/>
-            <a:ext cx="4082954" cy="3600945"/>
+            <a:off x="3384646" y="2157901"/>
+            <a:ext cx="4082954" cy="4031833"/>
           </a:xfrm>
           <a:prstGeom prst="rect">
             <a:avLst/>
@@ -11348,7 +11348,7 @@
                 <a:cs typeface="Calibri"/>
                 <a:sym typeface="Calibri"/>
               </a:rPr>
-              <a:t>Friday, </a:t>
+              <a:t>Wednesday, </a:t>
             </a:r>
             <a:r>
               <a:rPr lang="en-US" sz="2800" b="1" dirty="0">

</xml_diff>